<commit_message>
Fix up git commands
</commit_message>
<xml_diff>
--- a/slides/Week2z.pptx
+++ b/slides/Week2z.pptx
@@ -5,7 +5,7 @@
     <p:sldMasterId id="2147483648" r:id="rId1"/>
   </p:sldMasterIdLst>
   <p:notesMasterIdLst>
-    <p:notesMasterId r:id="rId12"/>
+    <p:notesMasterId r:id="rId14"/>
   </p:notesMasterIdLst>
   <p:sldIdLst>
     <p:sldId id="256" r:id="rId2"/>
@@ -18,6 +18,8 @@
     <p:sldId id="263" r:id="rId9"/>
     <p:sldId id="264" r:id="rId10"/>
     <p:sldId id="268" r:id="rId11"/>
+    <p:sldId id="274" r:id="rId12"/>
+    <p:sldId id="275" r:id="rId13"/>
   </p:sldIdLst>
   <p:sldSz cx="9363075" cy="5257800"/>
   <p:notesSz cx="6858000" cy="9144000"/>
@@ -3646,7 +3648,7 @@
             </a:r>
             <a:r>
               <a:rPr lang="en-AU" dirty="0" smtClean="0"/>
-              <a:t>Command History</a:t>
+              <a:t>Command History and Definitely the last bit of GIT</a:t>
             </a:r>
             <a:endParaRPr dirty="0"/>
           </a:p>
@@ -3842,6 +3844,852 @@
         </p:txBody>
       </p:sp>
     </p:spTree>
+  </p:cSld>
+  <p:clrMapOvr>
+    <a:masterClrMapping/>
+  </p:clrMapOvr>
+  <p:transition xmlns:p14="http://schemas.microsoft.com/office/powerpoint/2010/main" spd="slow"/>
+</p:sld>
+</file>
+
+<file path=ppt/slides/slide11.xml><?xml version="1.0" encoding="utf-8"?>
+<p:sld xmlns:a="http://schemas.openxmlformats.org/drawingml/2006/main" xmlns:r="http://schemas.openxmlformats.org/officeDocument/2006/relationships" xmlns:p="http://schemas.openxmlformats.org/presentationml/2006/main">
+  <p:cSld>
+    <p:spTree>
+      <p:nvGrpSpPr>
+        <p:cNvPr id="1" name=""/>
+        <p:cNvGrpSpPr/>
+        <p:nvPr/>
+      </p:nvGrpSpPr>
+      <p:grpSpPr>
+        <a:xfrm>
+          <a:off x="0" y="0"/>
+          <a:ext cx="0" cy="0"/>
+          <a:chOff x="0" y="0"/>
+          <a:chExt cx="0" cy="0"/>
+        </a:xfrm>
+      </p:grpSpPr>
+      <p:sp>
+        <p:nvSpPr>
+          <p:cNvPr id="239" name="Shape 239"/>
+          <p:cNvSpPr/>
+          <p:nvPr/>
+        </p:nvSpPr>
+        <p:spPr>
+          <a:xfrm>
+            <a:off x="457200" y="487362"/>
+            <a:ext cx="8448675" cy="1588"/>
+          </a:xfrm>
+          <a:prstGeom prst="line">
+            <a:avLst/>
+          </a:prstGeom>
+          <a:ln w="6350">
+            <a:solidFill>
+              <a:srgbClr val="FFFFFF"/>
+            </a:solidFill>
+            <a:miter lim="400000"/>
+          </a:ln>
+        </p:spPr>
+        <p:txBody>
+          <a:bodyPr lIns="0" tIns="0" rIns="0" bIns="0"/>
+          <a:lstStyle/>
+          <a:p>
+            <a:pPr algn="l" defTabSz="457200">
+              <a:defRPr sz="1200" b="0">
+                <a:uFillTx/>
+              </a:defRPr>
+            </a:pPr>
+            <a:endParaRPr/>
+          </a:p>
+        </p:txBody>
+      </p:sp>
+      <p:sp>
+        <p:nvSpPr>
+          <p:cNvPr id="240" name="Shape 240"/>
+          <p:cNvSpPr/>
+          <p:nvPr/>
+        </p:nvSpPr>
+        <p:spPr>
+          <a:xfrm>
+            <a:off x="457200" y="908050"/>
+            <a:ext cx="8448675" cy="1588"/>
+          </a:xfrm>
+          <a:prstGeom prst="line">
+            <a:avLst/>
+          </a:prstGeom>
+          <a:ln w="6350">
+            <a:solidFill>
+              <a:srgbClr val="FFFFFF"/>
+            </a:solidFill>
+            <a:miter lim="400000"/>
+          </a:ln>
+        </p:spPr>
+        <p:txBody>
+          <a:bodyPr lIns="0" tIns="0" rIns="0" bIns="0"/>
+          <a:lstStyle/>
+          <a:p>
+            <a:pPr algn="l" defTabSz="457200">
+              <a:defRPr sz="1200" b="0">
+                <a:uFillTx/>
+              </a:defRPr>
+            </a:pPr>
+            <a:endParaRPr/>
+          </a:p>
+        </p:txBody>
+      </p:sp>
+      <p:sp>
+        <p:nvSpPr>
+          <p:cNvPr id="241" name="Shape 241"/>
+          <p:cNvSpPr>
+            <a:spLocks noGrp="1"/>
+          </p:cNvSpPr>
+          <p:nvPr>
+            <p:ph type="title" idx="4294967295"/>
+          </p:nvPr>
+        </p:nvSpPr>
+        <p:spPr>
+          <a:xfrm>
+            <a:off x="347662" y="1116012"/>
+            <a:ext cx="8426451" cy="3894138"/>
+          </a:xfrm>
+          <a:prstGeom prst="rect">
+            <a:avLst/>
+          </a:prstGeom>
+        </p:spPr>
+        <p:txBody>
+          <a:bodyPr lIns="38100" tIns="38100" rIns="38100" bIns="38100"/>
+          <a:lstStyle>
+            <a:lvl1pPr marL="27728" marR="27728" algn="ctr" defTabSz="914400">
+              <a:lnSpc>
+                <a:spcPct val="70000"/>
+              </a:lnSpc>
+              <a:defRPr sz="8800"/>
+            </a:lvl1pPr>
+          </a:lstStyle>
+          <a:p>
+            <a:r>
+              <a:rPr lang="en-AU" dirty="0" smtClean="0"/>
+              <a:t>Definitely the last bit of git</a:t>
+            </a:r>
+            <a:br>
+              <a:rPr lang="en-AU" dirty="0" smtClean="0"/>
+            </a:br>
+            <a:r>
+              <a:rPr lang="en-AU" dirty="0" smtClean="0"/>
+              <a:t/>
+            </a:r>
+            <a:br>
+              <a:rPr lang="en-AU" dirty="0" smtClean="0"/>
+            </a:br>
+            <a:r>
+              <a:rPr lang="en-AU" sz="2000" dirty="0" smtClean="0"/>
+              <a:t>Unless you want to learn about the branching workflow</a:t>
+            </a:r>
+            <a:endParaRPr dirty="0"/>
+          </a:p>
+        </p:txBody>
+      </p:sp>
+      <p:sp>
+        <p:nvSpPr>
+          <p:cNvPr id="242" name="Shape 242"/>
+          <p:cNvSpPr>
+            <a:spLocks noGrp="1"/>
+          </p:cNvSpPr>
+          <p:nvPr>
+            <p:ph type="body" sz="quarter" idx="4294967295"/>
+          </p:nvPr>
+        </p:nvSpPr>
+        <p:spPr>
+          <a:xfrm>
+            <a:off x="371475" y="495300"/>
+            <a:ext cx="6400800" cy="620713"/>
+          </a:xfrm>
+          <a:prstGeom prst="rect">
+            <a:avLst/>
+          </a:prstGeom>
+        </p:spPr>
+        <p:txBody>
+          <a:bodyPr/>
+          <a:lstStyle>
+            <a:lvl1pPr marL="40639" marR="40639" indent="0" defTabSz="914400">
+              <a:buClr>
+                <a:srgbClr val="FFFFFF"/>
+              </a:buClr>
+              <a:buFont typeface="Helvetica"/>
+              <a:defRPr sz="2300"/>
+            </a:lvl1pPr>
+          </a:lstStyle>
+          <a:p>
+            <a:r>
+              <a:t>DATA SCIENCE PART TIME COURSE</a:t>
+            </a:r>
+          </a:p>
+        </p:txBody>
+      </p:sp>
+    </p:spTree>
+    <p:extLst>
+      <p:ext uri="{BB962C8B-B14F-4D97-AF65-F5344CB8AC3E}">
+        <p14:creationId xmlns:p14="http://schemas.microsoft.com/office/powerpoint/2010/main" val="1093499831"/>
+      </p:ext>
+    </p:extLst>
+  </p:cSld>
+  <p:clrMapOvr>
+    <a:masterClrMapping/>
+  </p:clrMapOvr>
+  <p:transition xmlns:p14="http://schemas.microsoft.com/office/powerpoint/2010/main" spd="slow"/>
+</p:sld>
+</file>
+
+<file path=ppt/slides/slide12.xml><?xml version="1.0" encoding="utf-8"?>
+<p:sld xmlns:a="http://schemas.openxmlformats.org/drawingml/2006/main" xmlns:r="http://schemas.openxmlformats.org/officeDocument/2006/relationships" xmlns:p="http://schemas.openxmlformats.org/presentationml/2006/main">
+  <p:cSld>
+    <p:spTree>
+      <p:nvGrpSpPr>
+        <p:cNvPr id="1" name=""/>
+        <p:cNvGrpSpPr/>
+        <p:nvPr/>
+      </p:nvGrpSpPr>
+      <p:grpSpPr>
+        <a:xfrm>
+          <a:off x="0" y="0"/>
+          <a:ext cx="0" cy="0"/>
+          <a:chOff x="0" y="0"/>
+          <a:chExt cx="0" cy="0"/>
+        </a:xfrm>
+      </p:grpSpPr>
+      <p:sp>
+        <p:nvSpPr>
+          <p:cNvPr id="203" name="Shape 203"/>
+          <p:cNvSpPr/>
+          <p:nvPr/>
+        </p:nvSpPr>
+        <p:spPr>
+          <a:xfrm>
+            <a:off x="457200" y="487362"/>
+            <a:ext cx="8448675" cy="1588"/>
+          </a:xfrm>
+          <a:prstGeom prst="line">
+            <a:avLst/>
+          </a:prstGeom>
+          <a:ln w="6350">
+            <a:solidFill>
+              <a:srgbClr val="000000"/>
+            </a:solidFill>
+            <a:miter lim="400000"/>
+          </a:ln>
+        </p:spPr>
+        <p:txBody>
+          <a:bodyPr lIns="0" tIns="0" rIns="0" bIns="0"/>
+          <a:lstStyle/>
+          <a:p>
+            <a:pPr algn="l" defTabSz="457200">
+              <a:defRPr sz="1200" b="0">
+                <a:uFillTx/>
+              </a:defRPr>
+            </a:pPr>
+            <a:endParaRPr/>
+          </a:p>
+        </p:txBody>
+      </p:sp>
+      <p:sp>
+        <p:nvSpPr>
+          <p:cNvPr id="204" name="Shape 204"/>
+          <p:cNvSpPr/>
+          <p:nvPr/>
+        </p:nvSpPr>
+        <p:spPr>
+          <a:xfrm>
+            <a:off x="457200" y="908050"/>
+            <a:ext cx="8448675" cy="1588"/>
+          </a:xfrm>
+          <a:prstGeom prst="line">
+            <a:avLst/>
+          </a:prstGeom>
+          <a:ln w="6350">
+            <a:solidFill>
+              <a:srgbClr val="000000"/>
+            </a:solidFill>
+            <a:miter lim="400000"/>
+          </a:ln>
+        </p:spPr>
+        <p:txBody>
+          <a:bodyPr lIns="0" tIns="0" rIns="0" bIns="0"/>
+          <a:lstStyle/>
+          <a:p>
+            <a:pPr algn="l" defTabSz="457200">
+              <a:defRPr sz="1200" b="0">
+                <a:uFillTx/>
+              </a:defRPr>
+            </a:pPr>
+            <a:endParaRPr/>
+          </a:p>
+        </p:txBody>
+      </p:sp>
+      <p:sp>
+        <p:nvSpPr>
+          <p:cNvPr id="205" name="Shape 205"/>
+          <p:cNvSpPr/>
+          <p:nvPr/>
+        </p:nvSpPr>
+        <p:spPr>
+          <a:xfrm>
+            <a:off x="457200" y="487362"/>
+            <a:ext cx="8448675" cy="1588"/>
+          </a:xfrm>
+          <a:prstGeom prst="line">
+            <a:avLst/>
+          </a:prstGeom>
+          <a:ln w="6350">
+            <a:solidFill>
+              <a:srgbClr val="000000"/>
+            </a:solidFill>
+            <a:miter lim="400000"/>
+          </a:ln>
+        </p:spPr>
+        <p:txBody>
+          <a:bodyPr lIns="0" tIns="0" rIns="0" bIns="0"/>
+          <a:lstStyle/>
+          <a:p>
+            <a:pPr algn="l" defTabSz="457200">
+              <a:defRPr sz="1200" b="0">
+                <a:uFillTx/>
+              </a:defRPr>
+            </a:pPr>
+            <a:endParaRPr/>
+          </a:p>
+        </p:txBody>
+      </p:sp>
+      <p:sp>
+        <p:nvSpPr>
+          <p:cNvPr id="206" name="Shape 206"/>
+          <p:cNvSpPr/>
+          <p:nvPr/>
+        </p:nvSpPr>
+        <p:spPr>
+          <a:xfrm>
+            <a:off x="457200" y="908050"/>
+            <a:ext cx="8448675" cy="1588"/>
+          </a:xfrm>
+          <a:prstGeom prst="line">
+            <a:avLst/>
+          </a:prstGeom>
+          <a:ln w="6350">
+            <a:solidFill>
+              <a:srgbClr val="000000"/>
+            </a:solidFill>
+            <a:miter lim="400000"/>
+          </a:ln>
+        </p:spPr>
+        <p:txBody>
+          <a:bodyPr lIns="0" tIns="0" rIns="0" bIns="0"/>
+          <a:lstStyle/>
+          <a:p>
+            <a:pPr algn="l" defTabSz="457200">
+              <a:defRPr sz="1200" b="0">
+                <a:uFillTx/>
+              </a:defRPr>
+            </a:pPr>
+            <a:endParaRPr/>
+          </a:p>
+        </p:txBody>
+      </p:sp>
+      <p:sp>
+        <p:nvSpPr>
+          <p:cNvPr id="207" name="Shape 207"/>
+          <p:cNvSpPr>
+            <a:spLocks noGrp="1"/>
+          </p:cNvSpPr>
+          <p:nvPr>
+            <p:ph type="sldNum" sz="quarter" idx="2"/>
+          </p:nvPr>
+        </p:nvSpPr>
+        <p:spPr>
+          <a:xfrm>
+            <a:off x="8685361" y="514350"/>
+            <a:ext cx="183853" cy="342901"/>
+          </a:xfrm>
+          <a:prstGeom prst="rect">
+            <a:avLst/>
+          </a:prstGeom>
+          <a:extLst>
+            <a:ext uri="{C572A759-6A51-4108-AA02-DFA0A04FC94B}">
+              <ma14:wrappingTextBoxFlag xmlns:ma14="http://schemas.microsoft.com/office/mac/drawingml/2011/main" val="1"/>
+            </a:ext>
+          </a:extLst>
+        </p:spPr>
+        <p:txBody>
+          <a:bodyPr/>
+          <a:lstStyle/>
+          <a:p>
+            <a:fld id="{86CB4B4D-7CA3-9044-876B-883B54F8677D}" type="slidenum">
+              <a:t>12</a:t>
+            </a:fld>
+            <a:endParaRPr/>
+          </a:p>
+        </p:txBody>
+      </p:sp>
+      <p:sp>
+        <p:nvSpPr>
+          <p:cNvPr id="208" name="Shape 208"/>
+          <p:cNvSpPr>
+            <a:spLocks noGrp="1"/>
+          </p:cNvSpPr>
+          <p:nvPr>
+            <p:ph type="title"/>
+          </p:nvPr>
+        </p:nvSpPr>
+        <p:spPr>
+          <a:prstGeom prst="rect">
+            <a:avLst/>
+          </a:prstGeom>
+        </p:spPr>
+        <p:txBody>
+          <a:bodyPr/>
+          <a:lstStyle/>
+          <a:p>
+            <a:r>
+              <a:rPr lang="en-AU" dirty="0" smtClean="0"/>
+              <a:t>Keeping in Sync with the course repository</a:t>
+            </a:r>
+            <a:endParaRPr dirty="0"/>
+          </a:p>
+        </p:txBody>
+      </p:sp>
+      <p:sp>
+        <p:nvSpPr>
+          <p:cNvPr id="3" name="TextBox 2"/>
+          <p:cNvSpPr txBox="1"/>
+          <p:nvPr/>
+        </p:nvSpPr>
+        <p:spPr>
+          <a:xfrm>
+            <a:off x="6152193" y="1026879"/>
+            <a:ext cx="2753682" cy="2580194"/>
+          </a:xfrm>
+          <a:prstGeom prst="rect">
+            <a:avLst/>
+          </a:prstGeom>
+          <a:solidFill>
+            <a:schemeClr val="bg2"/>
+          </a:solidFill>
+          <a:ln w="12700" cap="flat">
+            <a:solidFill>
+              <a:schemeClr val="bg1"/>
+            </a:solidFill>
+            <a:miter lim="400000"/>
+          </a:ln>
+          <a:effectLst/>
+          <a:sp3d/>
+        </p:spPr>
+        <p:style>
+          <a:lnRef idx="0">
+            <a:scrgbClr r="0" g="0" b="0"/>
+          </a:lnRef>
+          <a:fillRef idx="0">
+            <a:scrgbClr r="0" g="0" b="0"/>
+          </a:fillRef>
+          <a:effectRef idx="0">
+            <a:scrgbClr r="0" g="0" b="0"/>
+          </a:effectRef>
+          <a:fontRef idx="none"/>
+        </p:style>
+        <p:txBody>
+          <a:bodyPr rot="0" spcFirstLastPara="1" vertOverflow="overflow" horzOverflow="overflow" vert="horz" wrap="square" lIns="50800" tIns="50800" rIns="50800" bIns="50800" numCol="1" spcCol="38100" rtlCol="0" anchor="ctr">
+            <a:spAutoFit/>
+          </a:bodyPr>
+          <a:lstStyle/>
+          <a:p>
+            <a:pPr marR="0" algn="l" defTabSz="584200" rtl="0" fontAlgn="auto" latinLnBrk="0" hangingPunct="0">
+              <a:lnSpc>
+                <a:spcPct val="100000"/>
+              </a:lnSpc>
+              <a:spcBef>
+                <a:spcPts val="0"/>
+              </a:spcBef>
+              <a:spcAft>
+                <a:spcPts val="0"/>
+              </a:spcAft>
+              <a:buClrTx/>
+              <a:buSzTx/>
+              <a:tabLst/>
+            </a:pPr>
+            <a:r>
+              <a:rPr kumimoji="0" lang="en-US" sz="2300" i="0" u="none" strike="noStrike" cap="none" spc="0" normalizeH="0" baseline="0" dirty="0" smtClean="0">
+                <a:ln>
+                  <a:noFill/>
+                </a:ln>
+                <a:solidFill>
+                  <a:srgbClr val="000000"/>
+                </a:solidFill>
+                <a:effectLst/>
+                <a:uFill>
+                  <a:solidFill>
+                    <a:srgbClr val="000000"/>
+                  </a:solidFill>
+                </a:uFill>
+                <a:ea typeface="+mj-ea"/>
+                <a:sym typeface="Helvetica"/>
+              </a:rPr>
+              <a:t>Plan</a:t>
+            </a:r>
+            <a:r>
+              <a:rPr kumimoji="0" lang="en-US" sz="2300" i="0" u="none" strike="noStrike" cap="none" spc="0" normalizeH="0" dirty="0" smtClean="0">
+                <a:ln>
+                  <a:noFill/>
+                </a:ln>
+                <a:solidFill>
+                  <a:srgbClr val="000000"/>
+                </a:solidFill>
+                <a:effectLst/>
+                <a:uFill>
+                  <a:solidFill>
+                    <a:srgbClr val="000000"/>
+                  </a:solidFill>
+                </a:uFill>
+                <a:ea typeface="+mj-ea"/>
+                <a:sym typeface="Helvetica"/>
+              </a:rPr>
+              <a:t> A</a:t>
+            </a:r>
+            <a:endParaRPr kumimoji="0" lang="en-US" sz="2300" i="0" u="none" strike="noStrike" cap="none" spc="0" normalizeH="0" baseline="0" dirty="0" smtClean="0">
+              <a:ln>
+                <a:noFill/>
+              </a:ln>
+              <a:solidFill>
+                <a:srgbClr val="000000"/>
+              </a:solidFill>
+              <a:effectLst/>
+              <a:uFill>
+                <a:solidFill>
+                  <a:srgbClr val="000000"/>
+                </a:solidFill>
+              </a:uFill>
+              <a:ea typeface="+mj-ea"/>
+              <a:sym typeface="Helvetica"/>
+            </a:endParaRPr>
+          </a:p>
+          <a:p>
+            <a:pPr marL="457200" marR="0" indent="-457200" algn="l" defTabSz="584200" rtl="0" fontAlgn="auto" latinLnBrk="0" hangingPunct="0">
+              <a:lnSpc>
+                <a:spcPct val="100000"/>
+              </a:lnSpc>
+              <a:spcBef>
+                <a:spcPts val="0"/>
+              </a:spcBef>
+              <a:spcAft>
+                <a:spcPts val="0"/>
+              </a:spcAft>
+              <a:buClrTx/>
+              <a:buSzTx/>
+              <a:buFont typeface="+mj-lt"/>
+              <a:buAutoNum type="arabicPeriod"/>
+              <a:tabLst/>
+            </a:pPr>
+            <a:r>
+              <a:rPr kumimoji="0" lang="en-US" sz="2300" b="0" i="0" u="none" strike="noStrike" cap="none" spc="0" normalizeH="0" baseline="0" dirty="0" smtClean="0">
+                <a:ln>
+                  <a:noFill/>
+                </a:ln>
+                <a:solidFill>
+                  <a:srgbClr val="000000"/>
+                </a:solidFill>
+                <a:effectLst/>
+                <a:uFill>
+                  <a:solidFill>
+                    <a:srgbClr val="000000"/>
+                  </a:solidFill>
+                </a:uFill>
+                <a:ea typeface="+mj-ea"/>
+                <a:sym typeface="Helvetica"/>
+              </a:rPr>
+              <a:t>Create pull requests each Monday when you get to class</a:t>
+            </a:r>
+          </a:p>
+          <a:p>
+            <a:pPr marL="457200" marR="0" indent="-457200" algn="l" defTabSz="584200" rtl="0" fontAlgn="auto" latinLnBrk="0" hangingPunct="0">
+              <a:lnSpc>
+                <a:spcPct val="100000"/>
+              </a:lnSpc>
+              <a:spcBef>
+                <a:spcPts val="0"/>
+              </a:spcBef>
+              <a:spcAft>
+                <a:spcPts val="0"/>
+              </a:spcAft>
+              <a:buClrTx/>
+              <a:buSzTx/>
+              <a:buFont typeface="+mj-lt"/>
+              <a:buAutoNum type="arabicPeriod"/>
+              <a:tabLst/>
+            </a:pPr>
+            <a:r>
+              <a:rPr kumimoji="0" lang="en-US" sz="2300" b="0" i="0" u="none" strike="noStrike" cap="none" spc="0" normalizeH="0" baseline="0" dirty="0" smtClean="0">
+                <a:ln>
+                  <a:noFill/>
+                </a:ln>
+                <a:solidFill>
+                  <a:srgbClr val="000000"/>
+                </a:solidFill>
+                <a:effectLst/>
+                <a:uFill>
+                  <a:solidFill>
+                    <a:srgbClr val="000000"/>
+                  </a:solidFill>
+                </a:uFill>
+                <a:ea typeface="+mj-ea"/>
+                <a:sym typeface="Helvetica"/>
+              </a:rPr>
+              <a:t>Approve your pull request</a:t>
+            </a:r>
+            <a:endParaRPr kumimoji="0" lang="en-US" sz="2300" b="0" i="0" u="none" strike="noStrike" cap="none" spc="0" normalizeH="0" baseline="0" dirty="0" smtClean="0">
+              <a:ln>
+                <a:noFill/>
+              </a:ln>
+              <a:solidFill>
+                <a:srgbClr val="000000"/>
+              </a:solidFill>
+              <a:effectLst/>
+              <a:uFill>
+                <a:solidFill>
+                  <a:srgbClr val="000000"/>
+                </a:solidFill>
+              </a:uFill>
+              <a:latin typeface="Courier"/>
+              <a:ea typeface="+mj-ea"/>
+              <a:cs typeface="Courier"/>
+              <a:sym typeface="Helvetica"/>
+            </a:endParaRPr>
+          </a:p>
+        </p:txBody>
+      </p:sp>
+      <p:sp>
+        <p:nvSpPr>
+          <p:cNvPr id="2" name="TextBox 1"/>
+          <p:cNvSpPr txBox="1"/>
+          <p:nvPr/>
+        </p:nvSpPr>
+        <p:spPr>
+          <a:xfrm>
+            <a:off x="179714" y="739197"/>
+            <a:ext cx="5972479" cy="1564531"/>
+          </a:xfrm>
+          <a:prstGeom prst="rect">
+            <a:avLst/>
+          </a:prstGeom>
+          <a:noFill/>
+          <a:ln w="12700" cap="flat">
+            <a:noFill/>
+            <a:miter lim="400000"/>
+          </a:ln>
+          <a:effectLst/>
+          <a:sp3d/>
+        </p:spPr>
+        <p:style>
+          <a:lnRef idx="0">
+            <a:scrgbClr r="0" g="0" b="0"/>
+          </a:lnRef>
+          <a:fillRef idx="0">
+            <a:scrgbClr r="0" g="0" b="0"/>
+          </a:fillRef>
+          <a:effectRef idx="0">
+            <a:scrgbClr r="0" g="0" b="0"/>
+          </a:effectRef>
+          <a:fontRef idx="none"/>
+        </p:style>
+        <p:txBody>
+          <a:bodyPr rot="0" spcFirstLastPara="1" vertOverflow="overflow" horzOverflow="overflow" vert="horz" wrap="square" lIns="50800" tIns="50800" rIns="50800" bIns="50800" numCol="1" spcCol="38100" rtlCol="0" anchor="ctr">
+            <a:spAutoFit/>
+          </a:bodyPr>
+          <a:lstStyle/>
+          <a:p>
+            <a:pPr algn="l"/>
+            <a:r>
+              <a:rPr lang="en-US" dirty="0" smtClean="0"/>
+              <a:t>Plan B</a:t>
+            </a:r>
+          </a:p>
+          <a:p>
+            <a:pPr algn="l"/>
+            <a:r>
+              <a:rPr lang="en-US" sz="1800" b="0" dirty="0" err="1" smtClean="0">
+                <a:latin typeface="Courier"/>
+                <a:cs typeface="Courier"/>
+              </a:rPr>
+              <a:t>git</a:t>
+            </a:r>
+            <a:r>
+              <a:rPr lang="en-US" sz="1800" b="0" dirty="0" smtClean="0">
+                <a:latin typeface="Courier"/>
+                <a:cs typeface="Courier"/>
+              </a:rPr>
+              <a:t> </a:t>
+            </a:r>
+            <a:r>
+              <a:rPr lang="en-US" sz="1800" b="0" dirty="0">
+                <a:latin typeface="Courier"/>
+                <a:cs typeface="Courier"/>
+              </a:rPr>
+              <a:t>remote add </a:t>
+            </a:r>
+            <a:r>
+              <a:rPr lang="en-US" sz="1800" b="0" u="sng" dirty="0">
+                <a:latin typeface="Courier"/>
+                <a:cs typeface="Courier"/>
+              </a:rPr>
+              <a:t>upstream</a:t>
+            </a:r>
+            <a:r>
+              <a:rPr lang="en-US" sz="1800" b="0" dirty="0">
+                <a:latin typeface="Courier"/>
+                <a:cs typeface="Courier"/>
+              </a:rPr>
+              <a:t> </a:t>
+            </a:r>
+            <a:r>
+              <a:rPr lang="en-US" sz="1800" b="0" dirty="0" smtClean="0">
+                <a:latin typeface="Courier"/>
+                <a:cs typeface="Courier"/>
+              </a:rPr>
+              <a:t>\</a:t>
+            </a:r>
+          </a:p>
+          <a:p>
+            <a:pPr algn="l"/>
+            <a:r>
+              <a:rPr lang="en-US" sz="1800" b="0" dirty="0">
+                <a:latin typeface="Courier"/>
+                <a:cs typeface="Courier"/>
+              </a:rPr>
+              <a:t> </a:t>
+            </a:r>
+            <a:r>
+              <a:rPr lang="en-US" sz="1800" b="0" dirty="0" smtClean="0">
+                <a:latin typeface="Courier"/>
+                <a:cs typeface="Courier"/>
+                <a:hlinkClick r:id="rId2"/>
+              </a:rPr>
+              <a:t>https</a:t>
+            </a:r>
+            <a:r>
+              <a:rPr lang="en-US" sz="1800" b="0" dirty="0">
+                <a:latin typeface="Courier"/>
+                <a:cs typeface="Courier"/>
+                <a:hlinkClick r:id="rId2"/>
+              </a:rPr>
+              <a:t>://github.com</a:t>
+            </a:r>
+            <a:r>
+              <a:rPr lang="en-US" sz="1800" b="0" dirty="0" smtClean="0">
+                <a:latin typeface="Courier"/>
+                <a:cs typeface="Courier"/>
+                <a:hlinkClick r:id="rId2"/>
+              </a:rPr>
+              <a:t>/solresol/SYD_DAT_5.git</a:t>
+            </a:r>
+            <a:endParaRPr lang="en-US" sz="1800" b="0" dirty="0" smtClean="0">
+              <a:latin typeface="Courier"/>
+              <a:cs typeface="Courier"/>
+            </a:endParaRPr>
+          </a:p>
+          <a:p>
+            <a:pPr algn="l"/>
+            <a:r>
+              <a:rPr lang="en-US" sz="1800" b="0" dirty="0" err="1">
+                <a:latin typeface="Courier"/>
+                <a:cs typeface="Courier"/>
+              </a:rPr>
+              <a:t>g</a:t>
+            </a:r>
+            <a:r>
+              <a:rPr kumimoji="0" lang="en-US" sz="1800" b="0" i="0" u="none" strike="noStrike" cap="none" spc="0" normalizeH="0" baseline="0" dirty="0" err="1" smtClean="0">
+                <a:ln>
+                  <a:noFill/>
+                </a:ln>
+                <a:solidFill>
+                  <a:srgbClr val="000000"/>
+                </a:solidFill>
+                <a:effectLst/>
+                <a:uFill>
+                  <a:solidFill>
+                    <a:srgbClr val="000000"/>
+                  </a:solidFill>
+                </a:uFill>
+                <a:latin typeface="Courier"/>
+                <a:cs typeface="Courier"/>
+                <a:sym typeface="Helvetica"/>
+              </a:rPr>
+              <a:t>it</a:t>
+            </a:r>
+            <a:r>
+              <a:rPr kumimoji="0" lang="en-US" sz="1800" b="0" i="0" u="none" strike="noStrike" cap="none" spc="0" normalizeH="0" baseline="0" dirty="0" smtClean="0">
+                <a:ln>
+                  <a:noFill/>
+                </a:ln>
+                <a:solidFill>
+                  <a:srgbClr val="000000"/>
+                </a:solidFill>
+                <a:effectLst/>
+                <a:uFill>
+                  <a:solidFill>
+                    <a:srgbClr val="000000"/>
+                  </a:solidFill>
+                </a:uFill>
+                <a:latin typeface="Courier"/>
+                <a:cs typeface="Courier"/>
+                <a:sym typeface="Helvetica"/>
+              </a:rPr>
+              <a:t> pull --no-edit upstream master</a:t>
+            </a:r>
+          </a:p>
+          <a:p>
+            <a:pPr algn="l"/>
+            <a:r>
+              <a:rPr lang="en-US" sz="1800" b="0" dirty="0" err="1">
+                <a:latin typeface="Courier"/>
+                <a:cs typeface="Courier"/>
+              </a:rPr>
+              <a:t>g</a:t>
+            </a:r>
+            <a:r>
+              <a:rPr lang="en-US" sz="1800" b="0" dirty="0" err="1" smtClean="0">
+                <a:latin typeface="Courier"/>
+                <a:cs typeface="Courier"/>
+              </a:rPr>
+              <a:t>it</a:t>
+            </a:r>
+            <a:r>
+              <a:rPr lang="en-US" sz="1800" b="0" dirty="0" smtClean="0">
+                <a:latin typeface="Courier"/>
+                <a:cs typeface="Courier"/>
+              </a:rPr>
+              <a:t> push</a:t>
+            </a:r>
+            <a:endParaRPr kumimoji="0" lang="en-US" sz="1800" b="0" i="0" u="none" strike="noStrike" cap="none" spc="0" normalizeH="0" baseline="0" dirty="0">
+              <a:ln>
+                <a:noFill/>
+              </a:ln>
+              <a:solidFill>
+                <a:srgbClr val="000000"/>
+              </a:solidFill>
+              <a:effectLst/>
+              <a:uFill>
+                <a:solidFill>
+                  <a:srgbClr val="000000"/>
+                </a:solidFill>
+              </a:uFill>
+              <a:latin typeface="Courier"/>
+              <a:cs typeface="Courier"/>
+              <a:sym typeface="Helvetica"/>
+            </a:endParaRPr>
+          </a:p>
+        </p:txBody>
+      </p:sp>
+    </p:spTree>
+    <p:extLst>
+      <p:ext uri="{BB962C8B-B14F-4D97-AF65-F5344CB8AC3E}">
+        <p14:creationId xmlns:p14="http://schemas.microsoft.com/office/powerpoint/2010/main" val="3700966492"/>
+      </p:ext>
+    </p:extLst>
   </p:cSld>
   <p:clrMapOvr>
     <a:masterClrMapping/>

</xml_diff>